<commit_message>
New VBA Cheat Sheet
</commit_message>
<xml_diff>
--- a/02-VBA-Scripting/3/VBA_Cheat_Sheet.pptx
+++ b/02-VBA-Scripting/3/VBA_Cheat_Sheet.pptx
@@ -3405,7 +3405,7 @@
             </a:pPr>
             <a:r>
               <a:rPr lang="en-US" dirty="0" smtClean="0"/>
-              <a:t>Boolean – Contains logical True of False</a:t>
+              <a:t>Boolean – Contains logical True or False</a:t>
             </a:r>
           </a:p>
           <a:p>
@@ -7843,14 +7843,14 @@
           <p:nvPr>
             <p:extLst>
               <p:ext uri="{D42A27DB-BD31-4B8C-83A1-F6EECF244321}">
-                <p14:modId xmlns:p14="http://schemas.microsoft.com/office/powerpoint/2010/main" val="375909369"/>
+                <p14:modId xmlns:p14="http://schemas.microsoft.com/office/powerpoint/2010/main" val="122200086"/>
               </p:ext>
             </p:extLst>
           </p:nvPr>
         </p:nvGraphicFramePr>
         <p:xfrm>
-          <a:off x="990600" y="914400"/>
-          <a:ext cx="7010399" cy="4820583"/>
+          <a:off x="990600" y="1447292"/>
+          <a:ext cx="7010399" cy="4516291"/>
         </p:xfrm>
         <a:graphic>
           <a:graphicData uri="http://schemas.openxmlformats.org/drawingml/2006/table">
@@ -7861,7 +7861,7 @@
                 <a:gridCol w="2455961"/>
                 <a:gridCol w="2098477"/>
               </a:tblGrid>
-              <a:tr h="260679">
+              <a:tr h="320903">
                 <a:tc>
                   <a:txBody>
                     <a:bodyPr/>
@@ -8031,7 +8031,7 @@
                   </a:tcPr>
                 </a:tc>
               </a:tr>
-              <a:tr h="441149">
+              <a:tr h="399309">
                 <a:tc>
                   <a:txBody>
                     <a:bodyPr/>
@@ -8192,7 +8192,7 @@
                   </a:tcPr>
                 </a:tc>
               </a:tr>
-              <a:tr h="802090">
+              <a:tr h="726017">
                 <a:tc>
                   <a:txBody>
                     <a:bodyPr/>
@@ -8353,7 +8353,7 @@
                   </a:tcPr>
                 </a:tc>
               </a:tr>
-              <a:tr h="441149">
+              <a:tr h="569206">
                 <a:tc>
                   <a:txBody>
                     <a:bodyPr/>
@@ -8514,7 +8514,7 @@
                   </a:tcPr>
                 </a:tc>
               </a:tr>
-              <a:tr h="802090">
+              <a:tr h="726017">
                 <a:tc>
                   <a:txBody>
                     <a:bodyPr/>
@@ -8675,7 +8675,7 @@
                   </a:tcPr>
                 </a:tc>
               </a:tr>
-              <a:tr h="1163030">
+              <a:tr h="1052724">
                 <a:tc>
                   <a:txBody>
                     <a:bodyPr/>
@@ -8836,7 +8836,7 @@
                   </a:tcPr>
                 </a:tc>
               </a:tr>
-              <a:tr h="441149">
+              <a:tr h="569206">
                 <a:tc>
                   <a:txBody>
                     <a:bodyPr/>
@@ -8897,7 +8897,7 @@
                     <a:p>
                       <a:pPr fontAlgn="t"/>
                       <a:r>
-                        <a:rPr lang="en-US" sz="1800">
+                        <a:rPr lang="en-US" sz="1800" dirty="0">
                           <a:effectLst/>
                         </a:rPr>
                         <a:t>Exponentiation operator</a:t>
@@ -9053,6 +9053,49 @@
               <a:t>, Date Accessed – 3/5/2019</a:t>
             </a:r>
             <a:endParaRPr lang="en-US" sz="1600" dirty="0"/>
+          </a:p>
+        </p:txBody>
+      </p:sp>
+      <p:sp>
+        <p:nvSpPr>
+          <p:cNvPr id="5" name="Rectangle 4"/>
+          <p:cNvSpPr/>
+          <p:nvPr/>
+        </p:nvSpPr>
+        <p:spPr>
+          <a:xfrm>
+            <a:off x="874776" y="685800"/>
+            <a:ext cx="7126224" cy="923330"/>
+          </a:xfrm>
+          <a:prstGeom prst="rect">
+            <a:avLst/>
+          </a:prstGeom>
+        </p:spPr>
+        <p:txBody>
+          <a:bodyPr wrap="square">
+            <a:spAutoFit/>
+          </a:bodyPr>
+          <a:lstStyle/>
+          <a:p>
+            <a:r>
+              <a:rPr lang="en-US" dirty="0"/>
+              <a:t>Assume variable A holds 5 and variable B holds 10, </a:t>
+            </a:r>
+            <a:r>
+              <a:rPr lang="en-US" dirty="0" smtClean="0"/>
+              <a:t>then</a:t>
+            </a:r>
+            <a:endParaRPr lang="en-US" dirty="0"/>
+          </a:p>
+          <a:p>
+            <a:r>
+              <a:rPr lang="en-US" dirty="0"/>
+              <a:t/>
+            </a:r>
+            <a:br>
+              <a:rPr lang="en-US" dirty="0"/>
+            </a:br>
+            <a:endParaRPr lang="en-US" dirty="0"/>
           </a:p>
         </p:txBody>
       </p:sp>
@@ -11072,25 +11115,25 @@
           <p:nvPr>
             <p:extLst>
               <p:ext uri="{D42A27DB-BD31-4B8C-83A1-F6EECF244321}">
-                <p14:modId xmlns:p14="http://schemas.microsoft.com/office/powerpoint/2010/main" val="350194118"/>
+                <p14:modId xmlns:p14="http://schemas.microsoft.com/office/powerpoint/2010/main" val="101464643"/>
               </p:ext>
             </p:extLst>
           </p:nvPr>
         </p:nvGraphicFramePr>
         <p:xfrm>
-          <a:off x="1133856" y="848677"/>
-          <a:ext cx="6934200" cy="4585365"/>
+          <a:off x="990600" y="1255613"/>
+          <a:ext cx="7077456" cy="4178429"/>
         </p:xfrm>
         <a:graphic>
           <a:graphicData uri="http://schemas.openxmlformats.org/drawingml/2006/table">
             <a:tbl>
               <a:tblPr/>
               <a:tblGrid>
-                <a:gridCol w="1685544"/>
-                <a:gridCol w="3595470"/>
-                <a:gridCol w="1653186"/>
+                <a:gridCol w="1720366"/>
+                <a:gridCol w="3669750"/>
+                <a:gridCol w="1687340"/>
               </a:tblGrid>
-              <a:tr h="229327">
+              <a:tr h="215445">
                 <a:tc>
                   <a:txBody>
                     <a:bodyPr/>
@@ -11260,7 +11303,7 @@
                   </a:tcPr>
                 </a:tc>
               </a:tr>
-              <a:tr h="589953">
+              <a:tr h="512870">
                 <a:tc>
                   <a:txBody>
                     <a:bodyPr/>
@@ -11421,7 +11464,7 @@
                   </a:tcPr>
                 </a:tc>
               </a:tr>
-              <a:tr h="669202">
+              <a:tr h="586410">
                 <a:tc>
                   <a:txBody>
                     <a:bodyPr/>
@@ -11429,7 +11472,7 @@
                     <a:p>
                       <a:pPr algn="ctr" fontAlgn="t"/>
                       <a:r>
-                        <a:rPr lang="en-US" sz="1400">
+                        <a:rPr lang="en-US" sz="1400" dirty="0">
                           <a:effectLst/>
                         </a:rPr>
                         <a:t>&lt;&gt;</a:t>
@@ -11582,7 +11625,7 @@
                   </a:tcPr>
                 </a:tc>
               </a:tr>
-              <a:tr h="748448">
+              <a:tr h="650656">
                 <a:tc>
                   <a:txBody>
                     <a:bodyPr/>
@@ -11743,7 +11786,7 @@
                   </a:tcPr>
                 </a:tc>
               </a:tr>
-              <a:tr h="748448">
+              <a:tr h="650656">
                 <a:tc>
                   <a:txBody>
                     <a:bodyPr/>
@@ -11904,7 +11947,7 @@
                   </a:tcPr>
                 </a:tc>
               </a:tr>
-              <a:tr h="827696">
+              <a:tr h="719549">
                 <a:tc>
                   <a:txBody>
                     <a:bodyPr/>
@@ -12065,7 +12108,7 @@
                   </a:tcPr>
                 </a:tc>
               </a:tr>
-              <a:tr h="748448">
+              <a:tr h="650656">
                 <a:tc>
                   <a:txBody>
                     <a:bodyPr/>
@@ -12230,6 +12273,49 @@
           </a:graphicData>
         </a:graphic>
       </p:graphicFrame>
+      <p:sp>
+        <p:nvSpPr>
+          <p:cNvPr id="5" name="Rectangle 4"/>
+          <p:cNvSpPr/>
+          <p:nvPr/>
+        </p:nvSpPr>
+        <p:spPr>
+          <a:xfrm>
+            <a:off x="981456" y="609600"/>
+            <a:ext cx="7239000" cy="923330"/>
+          </a:xfrm>
+          <a:prstGeom prst="rect">
+            <a:avLst/>
+          </a:prstGeom>
+        </p:spPr>
+        <p:txBody>
+          <a:bodyPr wrap="square">
+            <a:spAutoFit/>
+          </a:bodyPr>
+          <a:lstStyle/>
+          <a:p>
+            <a:r>
+              <a:rPr lang="en-US" dirty="0"/>
+              <a:t>Assume variable A holds 10 and variable B holds 20, </a:t>
+            </a:r>
+            <a:r>
+              <a:rPr lang="en-US" dirty="0" smtClean="0"/>
+              <a:t>then</a:t>
+            </a:r>
+            <a:endParaRPr lang="en-US" dirty="0"/>
+          </a:p>
+          <a:p>
+            <a:r>
+              <a:rPr lang="en-US" dirty="0"/>
+              <a:t/>
+            </a:r>
+            <a:br>
+              <a:rPr lang="en-US" dirty="0"/>
+            </a:br>
+            <a:endParaRPr lang="en-US" dirty="0"/>
+          </a:p>
+        </p:txBody>
+      </p:sp>
     </p:spTree>
     <p:extLst>
       <p:ext uri="{BB962C8B-B14F-4D97-AF65-F5344CB8AC3E}">
@@ -12359,25 +12445,25 @@
           <p:nvPr>
             <p:extLst>
               <p:ext uri="{D42A27DB-BD31-4B8C-83A1-F6EECF244321}">
-                <p14:modId xmlns:p14="http://schemas.microsoft.com/office/powerpoint/2010/main" val="1573668777"/>
+                <p14:modId xmlns:p14="http://schemas.microsoft.com/office/powerpoint/2010/main" val="994653347"/>
               </p:ext>
             </p:extLst>
           </p:nvPr>
         </p:nvGraphicFramePr>
         <p:xfrm>
-          <a:off x="838200" y="914399"/>
-          <a:ext cx="7315201" cy="4511327"/>
+          <a:off x="609599" y="1218089"/>
+          <a:ext cx="7543802" cy="4207637"/>
         </p:xfrm>
         <a:graphic>
           <a:graphicData uri="http://schemas.openxmlformats.org/drawingml/2006/table">
             <a:tbl>
               <a:tblPr/>
               <a:tblGrid>
-                <a:gridCol w="1752600"/>
-                <a:gridCol w="3372886"/>
-                <a:gridCol w="2189715"/>
+                <a:gridCol w="1807369"/>
+                <a:gridCol w="3478289"/>
+                <a:gridCol w="2258144"/>
               </a:tblGrid>
-              <a:tr h="148190">
+              <a:tr h="276419">
                 <a:tc>
                   <a:txBody>
                     <a:bodyPr/>
@@ -12547,7 +12633,7 @@
                   </a:tcPr>
                 </a:tc>
               </a:tr>
-              <a:tr h="765753">
+              <a:tr h="740056">
                 <a:tc>
                   <a:txBody>
                     <a:bodyPr/>
@@ -12708,7 +12794,7 @@
                   </a:tcPr>
                 </a:tc>
               </a:tr>
-              <a:tr h="765753">
+              <a:tr h="740056">
                 <a:tc>
                   <a:txBody>
                     <a:bodyPr/>
@@ -12869,7 +12955,7 @@
                   </a:tcPr>
                 </a:tc>
               </a:tr>
-              <a:tr h="1280389">
+              <a:tr h="1093901">
                 <a:tc>
                   <a:txBody>
                     <a:bodyPr/>
@@ -13030,7 +13116,7 @@
                   </a:tcPr>
                 </a:tc>
               </a:tr>
-              <a:tr h="1383316">
+              <a:tr h="1203693">
                 <a:tc>
                   <a:txBody>
                     <a:bodyPr/>
@@ -13091,7 +13177,7 @@
                     <a:p>
                       <a:pPr fontAlgn="t"/>
                       <a:r>
-                        <a:rPr lang="en-US" sz="1600">
+                        <a:rPr lang="en-US" sz="1600" dirty="0">
                           <a:effectLst/>
                         </a:rPr>
                         <a:t>Called Logical Exclusion. It is the combination of NOT and OR Operator. If one, and only one, of the expressions evaluates to be True, the result is True.</a:t>
@@ -13195,6 +13281,49 @@
           </a:graphicData>
         </a:graphic>
       </p:graphicFrame>
+      <p:sp>
+        <p:nvSpPr>
+          <p:cNvPr id="5" name="Rectangle 4"/>
+          <p:cNvSpPr/>
+          <p:nvPr/>
+        </p:nvSpPr>
+        <p:spPr>
+          <a:xfrm>
+            <a:off x="990600" y="685800"/>
+            <a:ext cx="7677912" cy="923330"/>
+          </a:xfrm>
+          <a:prstGeom prst="rect">
+            <a:avLst/>
+          </a:prstGeom>
+        </p:spPr>
+        <p:txBody>
+          <a:bodyPr wrap="square">
+            <a:spAutoFit/>
+          </a:bodyPr>
+          <a:lstStyle/>
+          <a:p>
+            <a:r>
+              <a:rPr lang="en-US" dirty="0"/>
+              <a:t>Assume variable A holds 10 and variable B holds </a:t>
+            </a:r>
+            <a:r>
+              <a:rPr lang="en-US" dirty="0" smtClean="0"/>
+              <a:t>0</a:t>
+            </a:r>
+            <a:endParaRPr lang="en-US" dirty="0"/>
+          </a:p>
+          <a:p>
+            <a:r>
+              <a:rPr lang="en-US" dirty="0"/>
+              <a:t/>
+            </a:r>
+            <a:br>
+              <a:rPr lang="en-US" dirty="0"/>
+            </a:br>
+            <a:endParaRPr lang="en-US" dirty="0"/>
+          </a:p>
+        </p:txBody>
+      </p:sp>
     </p:spTree>
     <p:extLst>
       <p:ext uri="{BB962C8B-B14F-4D97-AF65-F5344CB8AC3E}">

</xml_diff>